<commit_message>
Minor updates in text and animation in FastAPI deplyment result slide
</commit_message>
<xml_diff>
--- a/Docs/AutomaticImageCaptioning_Phase_2_Review_Grp15_B20_12Aug2023.pptx
+++ b/Docs/AutomaticImageCaptioning_Phase_2_Review_Grp15_B20_12Aug2023.pptx
@@ -2921,7 +2921,7 @@
         <a:p>
           <a:r>
             <a:rPr lang="en-US" sz="1400" i="0" dirty="0"/>
-            <a:t>Using </a:t>
+            <a:t>Use </a:t>
           </a:r>
           <a:r>
             <a:rPr lang="en-US" sz="2200" b="1" i="0" dirty="0"/>
@@ -4357,18 +4357,22 @@
           </a:r>
           <a:r>
             <a:rPr lang="en-US" sz="1900" b="1" dirty="0"/>
-            <a:t>updated .</a:t>
-          </a:r>
-          <a:r>
-            <a:rPr lang="en-US" sz="1900" b="1" dirty="0" err="1"/>
+            <a:t>updated </a:t>
+          </a:r>
+          <a:r>
+            <a:rPr lang="en-US" sz="2200" b="1" dirty="0"/>
+            <a:t>.</a:t>
+          </a:r>
+          <a:r>
+            <a:rPr lang="en-US" sz="2200" b="1" dirty="0" err="1"/>
             <a:t>py</a:t>
           </a:r>
           <a:r>
-            <a:rPr lang="en-US" sz="1900" b="1" dirty="0"/>
+            <a:rPr lang="en-US" sz="2200" b="1" dirty="0"/>
             <a:t> code &amp; UI</a:t>
           </a:r>
           <a:r>
-            <a:rPr lang="en-US" sz="1900" dirty="0"/>
+            <a:rPr lang="en-US" sz="2200" dirty="0"/>
             <a:t>.</a:t>
           </a:r>
         </a:p>
@@ -4481,7 +4485,7 @@
             <a:t>testing was </a:t>
           </a:r>
           <a:r>
-            <a:rPr lang="en-US" sz="1800" b="1" dirty="0"/>
+            <a:rPr lang="en-US" sz="2200" b="1" dirty="0"/>
             <a:t>longer time </a:t>
           </a:r>
           <a:r>
@@ -4489,12 +4493,12 @@
             <a:t>and </a:t>
           </a:r>
           <a:r>
-            <a:rPr lang="en-US" sz="1800" b="1" dirty="0"/>
-            <a:t>crashed</a:t>
-          </a:r>
-          <a:r>
-            <a:rPr lang="en-US" sz="1600" dirty="0"/>
-            <a:t>.</a:t>
+            <a:rPr lang="en-US" sz="2200" b="1" dirty="0"/>
+            <a:t>crashes </a:t>
+          </a:r>
+          <a:r>
+            <a:rPr lang="en-US" sz="1600" b="0" dirty="0"/>
+            <a:t>observed.</a:t>
           </a:r>
         </a:p>
       </dgm:t>
@@ -5437,7 +5441,7 @@
           </a:pPr>
           <a:r>
             <a:rPr lang="en-US" sz="1400" i="0" kern="1200" dirty="0"/>
-            <a:t>Using </a:t>
+            <a:t>Use </a:t>
           </a:r>
           <a:r>
             <a:rPr lang="en-US" sz="2200" b="1" i="0" kern="1200" dirty="0"/>
@@ -5614,8 +5618,8 @@
       </dsp:nvSpPr>
       <dsp:spPr>
         <a:xfrm>
-          <a:off x="0" y="2395"/>
-          <a:ext cx="9170126" cy="490863"/>
+          <a:off x="0" y="2168"/>
+          <a:ext cx="9170126" cy="517010"/>
         </a:xfrm>
         <a:prstGeom prst="roundRect">
           <a:avLst/>
@@ -5698,8 +5702,8 @@
         </a:p>
       </dsp:txBody>
       <dsp:txXfrm>
-        <a:off x="23962" y="26357"/>
-        <a:ext cx="9122202" cy="442939"/>
+        <a:off x="25238" y="27406"/>
+        <a:ext cx="9119650" cy="466534"/>
       </dsp:txXfrm>
     </dsp:sp>
     <dsp:sp modelId="{231D62B0-EBA2-420A-B22E-64D471A49BFA}">
@@ -5709,8 +5713,8 @@
       </dsp:nvSpPr>
       <dsp:spPr>
         <a:xfrm>
-          <a:off x="0" y="504982"/>
-          <a:ext cx="9170126" cy="597856"/>
+          <a:off x="0" y="530212"/>
+          <a:ext cx="9170126" cy="629702"/>
         </a:xfrm>
         <a:prstGeom prst="roundRect">
           <a:avLst/>
@@ -5784,8 +5788,8 @@
         </a:p>
       </dsp:txBody>
       <dsp:txXfrm>
-        <a:off x="29185" y="534167"/>
-        <a:ext cx="9111756" cy="539486"/>
+        <a:off x="30740" y="560952"/>
+        <a:ext cx="9108646" cy="568222"/>
       </dsp:txXfrm>
     </dsp:sp>
     <dsp:sp modelId="{84DEBE7B-E185-4EBE-8238-E456FD42172D}">
@@ -5795,8 +5799,8 @@
       </dsp:nvSpPr>
       <dsp:spPr>
         <a:xfrm>
-          <a:off x="0" y="1102838"/>
-          <a:ext cx="9170126" cy="1624483"/>
+          <a:off x="0" y="1159914"/>
+          <a:ext cx="9170126" cy="1528991"/>
         </a:xfrm>
         <a:prstGeom prst="rect">
           <a:avLst/>
@@ -6008,8 +6012,8 @@
         </a:p>
       </dsp:txBody>
       <dsp:txXfrm>
-        <a:off x="0" y="1102838"/>
-        <a:ext cx="9170126" cy="1624483"/>
+        <a:off x="0" y="1159914"/>
+        <a:ext cx="9170126" cy="1528991"/>
       </dsp:txXfrm>
     </dsp:sp>
     <dsp:sp modelId="{BD74904D-EE68-4EAA-BC3E-D3EB488107EE}">
@@ -6019,8 +6023,8 @@
       </dsp:nvSpPr>
       <dsp:spPr>
         <a:xfrm>
-          <a:off x="0" y="2727321"/>
-          <a:ext cx="9170126" cy="500052"/>
+          <a:off x="0" y="2688906"/>
+          <a:ext cx="9170126" cy="526689"/>
         </a:xfrm>
         <a:prstGeom prst="roundRect">
           <a:avLst/>
@@ -6106,8 +6110,8 @@
         </a:p>
       </dsp:txBody>
       <dsp:txXfrm>
-        <a:off x="24411" y="2751732"/>
-        <a:ext cx="9121304" cy="451230"/>
+        <a:off x="25711" y="2714617"/>
+        <a:ext cx="9118704" cy="475267"/>
       </dsp:txXfrm>
     </dsp:sp>
     <dsp:sp modelId="{25B56ED5-03A3-4228-AF56-E5DDC38F9840}">
@@ -6117,8 +6121,8 @@
       </dsp:nvSpPr>
       <dsp:spPr>
         <a:xfrm>
-          <a:off x="0" y="3227374"/>
-          <a:ext cx="9170126" cy="1397559"/>
+          <a:off x="0" y="3215595"/>
+          <a:ext cx="9170126" cy="1315406"/>
         </a:xfrm>
         <a:prstGeom prst="rect">
           <a:avLst/>
@@ -6284,8 +6288,8 @@
         </a:p>
       </dsp:txBody>
       <dsp:txXfrm>
-        <a:off x="0" y="3227374"/>
-        <a:ext cx="9170126" cy="1397559"/>
+        <a:off x="0" y="3215595"/>
+        <a:ext cx="9170126" cy="1315406"/>
       </dsp:txXfrm>
     </dsp:sp>
     <dsp:sp modelId="{2256BB50-6BA7-4007-9114-FA53005A654B}">
@@ -6295,8 +6299,8 @@
       </dsp:nvSpPr>
       <dsp:spPr>
         <a:xfrm>
-          <a:off x="0" y="4624934"/>
-          <a:ext cx="9170126" cy="597856"/>
+          <a:off x="0" y="4531002"/>
+          <a:ext cx="9170126" cy="629702"/>
         </a:xfrm>
         <a:prstGeom prst="roundRect">
           <a:avLst/>
@@ -6374,8 +6378,8 @@
         </a:p>
       </dsp:txBody>
       <dsp:txXfrm>
-        <a:off x="29185" y="4654119"/>
-        <a:ext cx="9111756" cy="539486"/>
+        <a:off x="30740" y="4561742"/>
+        <a:ext cx="9108646" cy="568222"/>
       </dsp:txXfrm>
     </dsp:sp>
     <dsp:sp modelId="{4E722648-3749-4DAC-82BB-2EAA9730D7ED}">
@@ -6385,8 +6389,8 @@
       </dsp:nvSpPr>
       <dsp:spPr>
         <a:xfrm>
-          <a:off x="0" y="5234513"/>
-          <a:ext cx="9170126" cy="597856"/>
+          <a:off x="0" y="5171737"/>
+          <a:ext cx="9170126" cy="629702"/>
         </a:xfrm>
         <a:prstGeom prst="roundRect">
           <a:avLst/>
@@ -6488,8 +6492,8 @@
         </a:p>
       </dsp:txBody>
       <dsp:txXfrm>
-        <a:off x="29185" y="5263698"/>
-        <a:ext cx="9111756" cy="539486"/>
+        <a:off x="30740" y="5202477"/>
+        <a:ext cx="9108646" cy="568222"/>
       </dsp:txXfrm>
     </dsp:sp>
     <dsp:sp modelId="{D32F781F-2CD5-4A38-9A84-39B6DA3AA4BD}">
@@ -6499,8 +6503,8 @@
       </dsp:nvSpPr>
       <dsp:spPr>
         <a:xfrm>
-          <a:off x="0" y="5844092"/>
-          <a:ext cx="9170126" cy="597856"/>
+          <a:off x="0" y="5812473"/>
+          <a:ext cx="9170126" cy="629702"/>
         </a:xfrm>
         <a:prstGeom prst="roundRect">
           <a:avLst/>
@@ -6578,8 +6582,8 @@
         </a:p>
       </dsp:txBody>
       <dsp:txXfrm>
-        <a:off x="29185" y="5873277"/>
-        <a:ext cx="9111756" cy="539486"/>
+        <a:off x="30740" y="5843213"/>
+        <a:ext cx="9108646" cy="568222"/>
       </dsp:txXfrm>
     </dsp:sp>
   </dsp:spTree>
@@ -6601,8 +6605,8 @@
       </dsp:nvSpPr>
       <dsp:spPr>
         <a:xfrm>
-          <a:off x="0" y="3105"/>
-          <a:ext cx="9038423" cy="798524"/>
+          <a:off x="0" y="560"/>
+          <a:ext cx="9038423" cy="851760"/>
         </a:xfrm>
         <a:prstGeom prst="roundRect">
           <a:avLst/>
@@ -6693,8 +6697,8 @@
         </a:p>
       </dsp:txBody>
       <dsp:txXfrm>
-        <a:off x="38981" y="42086"/>
-        <a:ext cx="8960461" cy="720562"/>
+        <a:off x="41579" y="42139"/>
+        <a:ext cx="8955265" cy="768602"/>
       </dsp:txXfrm>
     </dsp:sp>
     <dsp:sp modelId="{7713B6D1-24EF-42B3-9441-A507B40A3956}">
@@ -6704,8 +6708,8 @@
       </dsp:nvSpPr>
       <dsp:spPr>
         <a:xfrm>
-          <a:off x="0" y="801630"/>
-          <a:ext cx="9038423" cy="397440"/>
+          <a:off x="0" y="852320"/>
+          <a:ext cx="9038423" cy="231840"/>
         </a:xfrm>
         <a:prstGeom prst="rect">
           <a:avLst/>
@@ -6769,8 +6773,8 @@
         </a:p>
       </dsp:txBody>
       <dsp:txXfrm>
-        <a:off x="0" y="801630"/>
-        <a:ext cx="9038423" cy="397440"/>
+        <a:off x="0" y="852320"/>
+        <a:ext cx="9038423" cy="231840"/>
       </dsp:txXfrm>
     </dsp:sp>
     <dsp:sp modelId="{6DDCA36F-7366-442D-BBB8-523035CC697C}">
@@ -6780,8 +6784,8 @@
       </dsp:nvSpPr>
       <dsp:spPr>
         <a:xfrm>
-          <a:off x="0" y="1199070"/>
-          <a:ext cx="9038423" cy="798524"/>
+          <a:off x="0" y="1084160"/>
+          <a:ext cx="9038423" cy="851760"/>
         </a:xfrm>
         <a:prstGeom prst="roundRect">
           <a:avLst/>
@@ -6878,25 +6882,29 @@
           </a:r>
           <a:r>
             <a:rPr lang="en-US" sz="1900" b="1" kern="1200" dirty="0"/>
-            <a:t>updated .</a:t>
-          </a:r>
-          <a:r>
-            <a:rPr lang="en-US" sz="1900" b="1" kern="1200" dirty="0" err="1"/>
+            <a:t>updated </a:t>
+          </a:r>
+          <a:r>
+            <a:rPr lang="en-US" sz="2200" b="1" kern="1200" dirty="0"/>
+            <a:t>.</a:t>
+          </a:r>
+          <a:r>
+            <a:rPr lang="en-US" sz="2200" b="1" kern="1200" dirty="0" err="1"/>
             <a:t>py</a:t>
           </a:r>
           <a:r>
-            <a:rPr lang="en-US" sz="1900" b="1" kern="1200" dirty="0"/>
+            <a:rPr lang="en-US" sz="2200" b="1" kern="1200" dirty="0"/>
             <a:t> code &amp; UI</a:t>
           </a:r>
           <a:r>
-            <a:rPr lang="en-US" sz="1900" kern="1200" dirty="0"/>
+            <a:rPr lang="en-US" sz="2200" kern="1200" dirty="0"/>
             <a:t>.</a:t>
           </a:r>
         </a:p>
       </dsp:txBody>
       <dsp:txXfrm>
-        <a:off x="38981" y="1238051"/>
-        <a:ext cx="8960461" cy="720562"/>
+        <a:off x="41579" y="1125739"/>
+        <a:ext cx="8955265" cy="768602"/>
       </dsp:txXfrm>
     </dsp:sp>
     <dsp:sp modelId="{E3CF1CE7-32BF-4D42-8AE8-412BA7CA7E37}">
@@ -6906,8 +6914,8 @@
       </dsp:nvSpPr>
       <dsp:spPr>
         <a:xfrm>
-          <a:off x="0" y="2066715"/>
-          <a:ext cx="9038423" cy="798524"/>
+          <a:off x="0" y="1958960"/>
+          <a:ext cx="9038423" cy="851760"/>
         </a:xfrm>
         <a:prstGeom prst="roundRect">
           <a:avLst/>
@@ -7002,8 +7010,8 @@
         </a:p>
       </dsp:txBody>
       <dsp:txXfrm>
-        <a:off x="38981" y="2105696"/>
-        <a:ext cx="8960461" cy="720562"/>
+        <a:off x="41579" y="2000539"/>
+        <a:ext cx="8955265" cy="768602"/>
       </dsp:txXfrm>
     </dsp:sp>
     <dsp:sp modelId="{60FF0547-4D55-4FF2-9E65-A9742CD8E9AB}">
@@ -7013,8 +7021,8 @@
       </dsp:nvSpPr>
       <dsp:spPr>
         <a:xfrm>
-          <a:off x="0" y="2934360"/>
-          <a:ext cx="9038423" cy="798524"/>
+          <a:off x="0" y="2833760"/>
+          <a:ext cx="9038423" cy="851760"/>
         </a:xfrm>
         <a:prstGeom prst="roundRect">
           <a:avLst/>
@@ -7086,7 +7094,7 @@
             <a:t>testing was </a:t>
           </a:r>
           <a:r>
-            <a:rPr lang="en-US" sz="1800" b="1" kern="1200" dirty="0"/>
+            <a:rPr lang="en-US" sz="2200" b="1" kern="1200" dirty="0"/>
             <a:t>longer time </a:t>
           </a:r>
           <a:r>
@@ -7094,18 +7102,18 @@
             <a:t>and </a:t>
           </a:r>
           <a:r>
-            <a:rPr lang="en-US" sz="1800" b="1" kern="1200" dirty="0"/>
-            <a:t>crashed</a:t>
-          </a:r>
-          <a:r>
-            <a:rPr lang="en-US" sz="1600" kern="1200" dirty="0"/>
-            <a:t>.</a:t>
+            <a:rPr lang="en-US" sz="2200" b="1" kern="1200" dirty="0"/>
+            <a:t>crashes </a:t>
+          </a:r>
+          <a:r>
+            <a:rPr lang="en-US" sz="1600" b="0" kern="1200" dirty="0"/>
+            <a:t>observed.</a:t>
           </a:r>
         </a:p>
       </dsp:txBody>
       <dsp:txXfrm>
-        <a:off x="38981" y="2973341"/>
-        <a:ext cx="8960461" cy="720562"/>
+        <a:off x="41579" y="2875339"/>
+        <a:ext cx="8955265" cy="768602"/>
       </dsp:txXfrm>
     </dsp:sp>
     <dsp:sp modelId="{B3B0D2D2-6723-4B70-AE88-2444E1286440}">
@@ -7115,8 +7123,8 @@
       </dsp:nvSpPr>
       <dsp:spPr>
         <a:xfrm>
-          <a:off x="0" y="3732885"/>
-          <a:ext cx="9038423" cy="911766"/>
+          <a:off x="0" y="3685520"/>
+          <a:ext cx="9038423" cy="901286"/>
         </a:xfrm>
         <a:prstGeom prst="rect">
           <a:avLst/>
@@ -7200,8 +7208,8 @@
         </a:p>
       </dsp:txBody>
       <dsp:txXfrm>
-        <a:off x="0" y="3732885"/>
-        <a:ext cx="9038423" cy="911766"/>
+        <a:off x="0" y="3685520"/>
+        <a:ext cx="9038423" cy="901286"/>
       </dsp:txXfrm>
     </dsp:sp>
     <dsp:sp modelId="{E91995A0-AE1F-4A9D-B1FE-B06013D09F26}">
@@ -7211,8 +7219,8 @@
       </dsp:nvSpPr>
       <dsp:spPr>
         <a:xfrm>
-          <a:off x="0" y="4644651"/>
-          <a:ext cx="9038423" cy="798524"/>
+          <a:off x="0" y="4586806"/>
+          <a:ext cx="9038423" cy="851760"/>
         </a:xfrm>
         <a:prstGeom prst="roundRect">
           <a:avLst/>
@@ -7317,8 +7325,8 @@
         </a:p>
       </dsp:txBody>
       <dsp:txXfrm>
-        <a:off x="38981" y="4683632"/>
-        <a:ext cx="8960461" cy="720562"/>
+        <a:off x="41579" y="4628385"/>
+        <a:ext cx="8955265" cy="768602"/>
       </dsp:txXfrm>
     </dsp:sp>
     <dsp:sp modelId="{56C891F1-808D-4870-AACA-C282ADE7A468}">
@@ -7328,8 +7336,8 @@
       </dsp:nvSpPr>
       <dsp:spPr>
         <a:xfrm>
-          <a:off x="0" y="5512296"/>
-          <a:ext cx="9038423" cy="798524"/>
+          <a:off x="0" y="5461606"/>
+          <a:ext cx="9038423" cy="851760"/>
         </a:xfrm>
         <a:prstGeom prst="roundRect">
           <a:avLst/>
@@ -7415,8 +7423,8 @@
         </a:p>
       </dsp:txBody>
       <dsp:txXfrm>
-        <a:off x="38981" y="5551277"/>
-        <a:ext cx="8960461" cy="720562"/>
+        <a:off x="41579" y="5503185"/>
+        <a:ext cx="8955265" cy="768602"/>
       </dsp:txXfrm>
     </dsp:sp>
   </dsp:spTree>
@@ -22803,7 +22811,7 @@
             <p:ph idx="1"/>
             <p:extLst>
               <p:ext uri="{D42A27DB-BD31-4B8C-83A1-F6EECF244321}">
-                <p14:modId xmlns:p14="http://schemas.microsoft.com/office/powerpoint/2010/main" val="3744660779"/>
+                <p14:modId xmlns:p14="http://schemas.microsoft.com/office/powerpoint/2010/main" val="2526468352"/>
               </p:ext>
             </p:extLst>
           </p:nvPr>
@@ -24371,7 +24379,7 @@
             <p:ph idx="1"/>
             <p:extLst>
               <p:ext uri="{D42A27DB-BD31-4B8C-83A1-F6EECF244321}">
-                <p14:modId xmlns:p14="http://schemas.microsoft.com/office/powerpoint/2010/main" val="2515568909"/>
+                <p14:modId xmlns:p14="http://schemas.microsoft.com/office/powerpoint/2010/main" val="689434090"/>
               </p:ext>
             </p:extLst>
           </p:nvPr>
@@ -24625,8 +24633,8 @@
         </p:blipFill>
         <p:spPr>
           <a:xfrm>
-            <a:off x="102126" y="39328"/>
-            <a:ext cx="3902790" cy="1956064"/>
+            <a:off x="102125" y="39328"/>
+            <a:ext cx="4435237" cy="2222924"/>
           </a:xfrm>
           <a:prstGeom prst="rect">
             <a:avLst/>
@@ -24655,8 +24663,8 @@
         </p:blipFill>
         <p:spPr>
           <a:xfrm>
-            <a:off x="102126" y="2100973"/>
-            <a:ext cx="4435237" cy="4567387"/>
+            <a:off x="102126" y="2294462"/>
+            <a:ext cx="4269018" cy="4396215"/>
           </a:xfrm>
           <a:prstGeom prst="rect">
             <a:avLst/>
@@ -24733,6 +24741,219 @@
   <p:clrMapOvr>
     <a:masterClrMapping/>
   </p:clrMapOvr>
+  <p:timing>
+    <p:tnLst>
+      <p:par>
+        <p:cTn id="1" dur="indefinite" restart="never" nodeType="tmRoot">
+          <p:childTnLst>
+            <p:seq concurrent="1" nextAc="seek">
+              <p:cTn id="2" dur="indefinite" nodeType="mainSeq">
+                <p:childTnLst>
+                  <p:par>
+                    <p:cTn id="3" fill="hold">
+                      <p:stCondLst>
+                        <p:cond delay="indefinite"/>
+                        <p:cond evt="onBegin" delay="0">
+                          <p:tn val="2"/>
+                        </p:cond>
+                      </p:stCondLst>
+                      <p:childTnLst>
+                        <p:par>
+                          <p:cTn id="4" fill="hold">
+                            <p:stCondLst>
+                              <p:cond delay="0"/>
+                            </p:stCondLst>
+                            <p:childTnLst>
+                              <p:par>
+                                <p:cTn id="5" presetID="1" presetClass="entr" presetSubtype="0" fill="hold" nodeType="withEffect">
+                                  <p:stCondLst>
+                                    <p:cond delay="0"/>
+                                  </p:stCondLst>
+                                  <p:childTnLst>
+                                    <p:set>
+                                      <p:cBhvr>
+                                        <p:cTn id="6" dur="1" fill="hold">
+                                          <p:stCondLst>
+                                            <p:cond delay="0"/>
+                                          </p:stCondLst>
+                                        </p:cTn>
+                                        <p:tgtEl>
+                                          <p:spTgt spid="6"/>
+                                        </p:tgtEl>
+                                        <p:attrNameLst>
+                                          <p:attrName>style.visibility</p:attrName>
+                                        </p:attrNameLst>
+                                      </p:cBhvr>
+                                      <p:to>
+                                        <p:strVal val="visible"/>
+                                      </p:to>
+                                    </p:set>
+                                  </p:childTnLst>
+                                </p:cTn>
+                              </p:par>
+                            </p:childTnLst>
+                          </p:cTn>
+                        </p:par>
+                      </p:childTnLst>
+                    </p:cTn>
+                  </p:par>
+                  <p:par>
+                    <p:cTn id="7" fill="hold">
+                      <p:stCondLst>
+                        <p:cond delay="indefinite"/>
+                      </p:stCondLst>
+                      <p:childTnLst>
+                        <p:par>
+                          <p:cTn id="8" fill="hold">
+                            <p:stCondLst>
+                              <p:cond delay="0"/>
+                            </p:stCondLst>
+                            <p:childTnLst>
+                              <p:par>
+                                <p:cTn id="9" presetID="1" presetClass="entr" presetSubtype="0" fill="hold" nodeType="clickEffect">
+                                  <p:stCondLst>
+                                    <p:cond delay="0"/>
+                                  </p:stCondLst>
+                                  <p:childTnLst>
+                                    <p:set>
+                                      <p:cBhvr>
+                                        <p:cTn id="10" dur="1" fill="hold">
+                                          <p:stCondLst>
+                                            <p:cond delay="0"/>
+                                          </p:stCondLst>
+                                        </p:cTn>
+                                        <p:tgtEl>
+                                          <p:spTgt spid="9"/>
+                                        </p:tgtEl>
+                                        <p:attrNameLst>
+                                          <p:attrName>style.visibility</p:attrName>
+                                        </p:attrNameLst>
+                                      </p:cBhvr>
+                                      <p:to>
+                                        <p:strVal val="visible"/>
+                                      </p:to>
+                                    </p:set>
+                                  </p:childTnLst>
+                                </p:cTn>
+                              </p:par>
+                            </p:childTnLst>
+                          </p:cTn>
+                        </p:par>
+                      </p:childTnLst>
+                    </p:cTn>
+                  </p:par>
+                  <p:par>
+                    <p:cTn id="11" fill="hold">
+                      <p:stCondLst>
+                        <p:cond delay="indefinite"/>
+                      </p:stCondLst>
+                      <p:childTnLst>
+                        <p:par>
+                          <p:cTn id="12" fill="hold">
+                            <p:stCondLst>
+                              <p:cond delay="0"/>
+                            </p:stCondLst>
+                            <p:childTnLst>
+                              <p:par>
+                                <p:cTn id="13" presetID="1" presetClass="entr" presetSubtype="0" fill="hold" nodeType="clickEffect">
+                                  <p:stCondLst>
+                                    <p:cond delay="0"/>
+                                  </p:stCondLst>
+                                  <p:childTnLst>
+                                    <p:set>
+                                      <p:cBhvr>
+                                        <p:cTn id="14" dur="1" fill="hold">
+                                          <p:stCondLst>
+                                            <p:cond delay="0"/>
+                                          </p:stCondLst>
+                                        </p:cTn>
+                                        <p:tgtEl>
+                                          <p:spTgt spid="12"/>
+                                        </p:tgtEl>
+                                        <p:attrNameLst>
+                                          <p:attrName>style.visibility</p:attrName>
+                                        </p:attrNameLst>
+                                      </p:cBhvr>
+                                      <p:to>
+                                        <p:strVal val="visible"/>
+                                      </p:to>
+                                    </p:set>
+                                  </p:childTnLst>
+                                </p:cTn>
+                              </p:par>
+                            </p:childTnLst>
+                          </p:cTn>
+                        </p:par>
+                      </p:childTnLst>
+                    </p:cTn>
+                  </p:par>
+                  <p:par>
+                    <p:cTn id="15" fill="hold">
+                      <p:stCondLst>
+                        <p:cond delay="indefinite"/>
+                      </p:stCondLst>
+                      <p:childTnLst>
+                        <p:par>
+                          <p:cTn id="16" fill="hold">
+                            <p:stCondLst>
+                              <p:cond delay="0"/>
+                            </p:stCondLst>
+                            <p:childTnLst>
+                              <p:par>
+                                <p:cTn id="17" presetID="1" presetClass="entr" presetSubtype="0" fill="hold" nodeType="clickEffect">
+                                  <p:stCondLst>
+                                    <p:cond delay="0"/>
+                                  </p:stCondLst>
+                                  <p:childTnLst>
+                                    <p:set>
+                                      <p:cBhvr>
+                                        <p:cTn id="18" dur="1" fill="hold">
+                                          <p:stCondLst>
+                                            <p:cond delay="0"/>
+                                          </p:stCondLst>
+                                        </p:cTn>
+                                        <p:tgtEl>
+                                          <p:spTgt spid="16"/>
+                                        </p:tgtEl>
+                                        <p:attrNameLst>
+                                          <p:attrName>style.visibility</p:attrName>
+                                        </p:attrNameLst>
+                                      </p:cBhvr>
+                                      <p:to>
+                                        <p:strVal val="visible"/>
+                                      </p:to>
+                                    </p:set>
+                                  </p:childTnLst>
+                                </p:cTn>
+                              </p:par>
+                            </p:childTnLst>
+                          </p:cTn>
+                        </p:par>
+                      </p:childTnLst>
+                    </p:cTn>
+                  </p:par>
+                </p:childTnLst>
+              </p:cTn>
+              <p:prevCondLst>
+                <p:cond evt="onPrev" delay="0">
+                  <p:tgtEl>
+                    <p:sldTgt/>
+                  </p:tgtEl>
+                </p:cond>
+              </p:prevCondLst>
+              <p:nextCondLst>
+                <p:cond evt="onNext" delay="0">
+                  <p:tgtEl>
+                    <p:sldTgt/>
+                  </p:tgtEl>
+                </p:cond>
+              </p:nextCondLst>
+            </p:seq>
+          </p:childTnLst>
+        </p:cTn>
+      </p:par>
+    </p:tnLst>
+  </p:timing>
 </p:sld>
 </file>
 

</xml_diff>